<commit_message>
Work on the pain expectancy protocol
</commit_message>
<xml_diff>
--- a/docs/mainz.med.painExpectancy.v1/Images.pptx
+++ b/docs/mainz.med.painExpectancy.v1/Images.pptx
@@ -5,13 +5,11 @@
     <p:sldMasterId id="2147483648" r:id="rId1"/>
   </p:sldMasterIdLst>
   <p:notesMasterIdLst>
-    <p:notesMasterId r:id="rId6"/>
+    <p:notesMasterId r:id="rId4"/>
   </p:notesMasterIdLst>
   <p:sldIdLst>
-    <p:sldId id="256" r:id="rId2"/>
-    <p:sldId id="257" r:id="rId3"/>
-    <p:sldId id="258" r:id="rId4"/>
-    <p:sldId id="259" r:id="rId5"/>
+    <p:sldId id="258" r:id="rId2"/>
+    <p:sldId id="259" r:id="rId3"/>
   </p:sldIdLst>
   <p:sldSz cx="12192000" cy="6858000"/>
   <p:notesSz cx="6858000" cy="9144000"/>
@@ -200,7 +198,7 @@
           <a:p>
             <a:fld id="{C75A29A1-A18F-4C86-A315-A030E9FEB606}" type="datetimeFigureOut">
               <a:rPr lang="en-DK" smtClean="0"/>
-              <a:t>11/07/2025</a:t>
+              <a:t>12/01/2026</a:t>
             </a:fld>
             <a:endParaRPr lang="en-DK"/>
           </a:p>
@@ -514,7 +512,7 @@
           <a:p>
             <a:r>
               <a:rPr lang="en-GB" dirty="0"/>
-              <a:t>Cue</a:t>
+              <a:t>Cross</a:t>
             </a:r>
             <a:endParaRPr lang="en-DK" dirty="0"/>
           </a:p>
@@ -546,7 +544,7 @@
     </p:spTree>
     <p:extLst>
       <p:ext uri="{BB962C8B-B14F-4D97-AF65-F5344CB8AC3E}">
-        <p14:creationId xmlns:p14="http://schemas.microsoft.com/office/powerpoint/2010/main" val="315845518"/>
+        <p14:creationId xmlns:p14="http://schemas.microsoft.com/office/powerpoint/2010/main" val="448650231"/>
       </p:ext>
     </p:extLst>
   </p:cSld>
@@ -557,182 +555,6 @@
 </file>
 
 <file path=ppt/notesSlides/notesSlide2.xml><?xml version="1.0" encoding="utf-8"?>
-<p:notes xmlns:a="http://schemas.openxmlformats.org/drawingml/2006/main" xmlns:r="http://schemas.openxmlformats.org/officeDocument/2006/relationships" xmlns:p="http://schemas.openxmlformats.org/presentationml/2006/main">
-  <p:cSld>
-    <p:spTree>
-      <p:nvGrpSpPr>
-        <p:cNvPr id="1" name=""/>
-        <p:cNvGrpSpPr/>
-        <p:nvPr/>
-      </p:nvGrpSpPr>
-      <p:grpSpPr>
-        <a:xfrm>
-          <a:off x="0" y="0"/>
-          <a:ext cx="0" cy="0"/>
-          <a:chOff x="0" y="0"/>
-          <a:chExt cx="0" cy="0"/>
-        </a:xfrm>
-      </p:grpSpPr>
-      <p:sp>
-        <p:nvSpPr>
-          <p:cNvPr id="2" name="Slide Image Placeholder 1"/>
-          <p:cNvSpPr>
-            <a:spLocks noGrp="1" noRot="1" noChangeAspect="1"/>
-          </p:cNvSpPr>
-          <p:nvPr>
-            <p:ph type="sldImg"/>
-          </p:nvPr>
-        </p:nvSpPr>
-        <p:spPr/>
-      </p:sp>
-      <p:sp>
-        <p:nvSpPr>
-          <p:cNvPr id="3" name="Notes Placeholder 2"/>
-          <p:cNvSpPr>
-            <a:spLocks noGrp="1"/>
-          </p:cNvSpPr>
-          <p:nvPr>
-            <p:ph type="body" idx="1"/>
-          </p:nvPr>
-        </p:nvSpPr>
-        <p:spPr/>
-        <p:txBody>
-          <a:bodyPr/>
-          <a:lstStyle/>
-          <a:p>
-            <a:r>
-              <a:rPr lang="en-GB" dirty="0"/>
-              <a:t>Cue01</a:t>
-            </a:r>
-            <a:endParaRPr lang="en-DK" dirty="0"/>
-          </a:p>
-        </p:txBody>
-      </p:sp>
-      <p:sp>
-        <p:nvSpPr>
-          <p:cNvPr id="4" name="Slide Number Placeholder 3"/>
-          <p:cNvSpPr>
-            <a:spLocks noGrp="1"/>
-          </p:cNvSpPr>
-          <p:nvPr>
-            <p:ph type="sldNum" sz="quarter" idx="5"/>
-          </p:nvPr>
-        </p:nvSpPr>
-        <p:spPr/>
-        <p:txBody>
-          <a:bodyPr/>
-          <a:lstStyle/>
-          <a:p>
-            <a:fld id="{B74545BC-EA28-43CB-9CEF-9A2E2FD0C97C}" type="slidenum">
-              <a:rPr lang="en-DK" smtClean="0"/>
-              <a:t>2</a:t>
-            </a:fld>
-            <a:endParaRPr lang="en-DK"/>
-          </a:p>
-        </p:txBody>
-      </p:sp>
-    </p:spTree>
-    <p:extLst>
-      <p:ext uri="{BB962C8B-B14F-4D97-AF65-F5344CB8AC3E}">
-        <p14:creationId xmlns:p14="http://schemas.microsoft.com/office/powerpoint/2010/main" val="4245649403"/>
-      </p:ext>
-    </p:extLst>
-  </p:cSld>
-  <p:clrMapOvr>
-    <a:masterClrMapping/>
-  </p:clrMapOvr>
-</p:notes>
-</file>
-
-<file path=ppt/notesSlides/notesSlide3.xml><?xml version="1.0" encoding="utf-8"?>
-<p:notes xmlns:a="http://schemas.openxmlformats.org/drawingml/2006/main" xmlns:r="http://schemas.openxmlformats.org/officeDocument/2006/relationships" xmlns:p="http://schemas.openxmlformats.org/presentationml/2006/main">
-  <p:cSld>
-    <p:spTree>
-      <p:nvGrpSpPr>
-        <p:cNvPr id="1" name=""/>
-        <p:cNvGrpSpPr/>
-        <p:nvPr/>
-      </p:nvGrpSpPr>
-      <p:grpSpPr>
-        <a:xfrm>
-          <a:off x="0" y="0"/>
-          <a:ext cx="0" cy="0"/>
-          <a:chOff x="0" y="0"/>
-          <a:chExt cx="0" cy="0"/>
-        </a:xfrm>
-      </p:grpSpPr>
-      <p:sp>
-        <p:nvSpPr>
-          <p:cNvPr id="2" name="Slide Image Placeholder 1"/>
-          <p:cNvSpPr>
-            <a:spLocks noGrp="1" noRot="1" noChangeAspect="1"/>
-          </p:cNvSpPr>
-          <p:nvPr>
-            <p:ph type="sldImg"/>
-          </p:nvPr>
-        </p:nvSpPr>
-        <p:spPr/>
-      </p:sp>
-      <p:sp>
-        <p:nvSpPr>
-          <p:cNvPr id="3" name="Notes Placeholder 2"/>
-          <p:cNvSpPr>
-            <a:spLocks noGrp="1"/>
-          </p:cNvSpPr>
-          <p:nvPr>
-            <p:ph type="body" idx="1"/>
-          </p:nvPr>
-        </p:nvSpPr>
-        <p:spPr/>
-        <p:txBody>
-          <a:bodyPr/>
-          <a:lstStyle/>
-          <a:p>
-            <a:r>
-              <a:rPr lang="en-GB" dirty="0"/>
-              <a:t>Cue02</a:t>
-            </a:r>
-            <a:endParaRPr lang="en-DK" dirty="0"/>
-          </a:p>
-        </p:txBody>
-      </p:sp>
-      <p:sp>
-        <p:nvSpPr>
-          <p:cNvPr id="4" name="Slide Number Placeholder 3"/>
-          <p:cNvSpPr>
-            <a:spLocks noGrp="1"/>
-          </p:cNvSpPr>
-          <p:nvPr>
-            <p:ph type="sldNum" sz="quarter" idx="5"/>
-          </p:nvPr>
-        </p:nvSpPr>
-        <p:spPr/>
-        <p:txBody>
-          <a:bodyPr/>
-          <a:lstStyle/>
-          <a:p>
-            <a:fld id="{B74545BC-EA28-43CB-9CEF-9A2E2FD0C97C}" type="slidenum">
-              <a:rPr lang="en-DK" smtClean="0"/>
-              <a:t>3</a:t>
-            </a:fld>
-            <a:endParaRPr lang="en-DK"/>
-          </a:p>
-        </p:txBody>
-      </p:sp>
-    </p:spTree>
-    <p:extLst>
-      <p:ext uri="{BB962C8B-B14F-4D97-AF65-F5344CB8AC3E}">
-        <p14:creationId xmlns:p14="http://schemas.microsoft.com/office/powerpoint/2010/main" val="448650231"/>
-      </p:ext>
-    </p:extLst>
-  </p:cSld>
-  <p:clrMapOvr>
-    <a:masterClrMapping/>
-  </p:clrMapOvr>
-</p:notes>
-</file>
-
-<file path=ppt/notesSlides/notesSlide4.xml><?xml version="1.0" encoding="utf-8"?>
 <p:notes xmlns:a="http://schemas.openxmlformats.org/drawingml/2006/main" xmlns:r="http://schemas.openxmlformats.org/officeDocument/2006/relationships" xmlns:p="http://schemas.openxmlformats.org/presentationml/2006/main">
   <p:cSld>
     <p:spTree>
@@ -801,7 +623,7 @@
           <a:p>
             <a:fld id="{B74545BC-EA28-43CB-9CEF-9A2E2FD0C97C}" type="slidenum">
               <a:rPr lang="en-DK" smtClean="0"/>
-              <a:t>4</a:t>
+              <a:t>2</a:t>
             </a:fld>
             <a:endParaRPr lang="en-DK"/>
           </a:p>
@@ -1183,84 +1005,12 @@
           <a:chExt cx="0" cy="0"/>
         </a:xfrm>
       </p:grpSpPr>
-      <p:pic>
-        <p:nvPicPr>
-          <p:cNvPr id="7" name="Picture 6" descr="A card with a person holding a spade and a spade&#10;&#10;AI-generated content may be incorrect.">
+      <p:sp>
+        <p:nvSpPr>
+          <p:cNvPr id="3" name="Plus Sign 2">
             <a:extLst>
               <a:ext uri="{FF2B5EF4-FFF2-40B4-BE49-F238E27FC236}">
-                <a16:creationId xmlns:a16="http://schemas.microsoft.com/office/drawing/2014/main" id="{A62CEEFB-2C7C-622F-0AC8-830AE6A351DA}"/>
-              </a:ext>
-            </a:extLst>
-          </p:cNvPr>
-          <p:cNvPicPr>
-            <a:picLocks noChangeAspect="1"/>
-          </p:cNvPicPr>
-          <p:nvPr/>
-        </p:nvPicPr>
-        <p:blipFill>
-          <a:blip r:embed="rId3">
-            <a:extLst>
-              <a:ext uri="{28A0092B-C50C-407E-A947-70E740481C1C}">
-                <a14:useLocalDpi xmlns:a14="http://schemas.microsoft.com/office/drawing/2010/main" val="0"/>
-              </a:ext>
-            </a:extLst>
-          </a:blip>
-          <a:stretch>
-            <a:fillRect/>
-          </a:stretch>
-        </p:blipFill>
-        <p:spPr>
-          <a:xfrm>
-            <a:off x="1856254" y="770964"/>
-            <a:ext cx="2890588" cy="4320000"/>
-          </a:xfrm>
-          <a:prstGeom prst="rect">
-            <a:avLst/>
-          </a:prstGeom>
-        </p:spPr>
-      </p:pic>
-      <p:pic>
-        <p:nvPicPr>
-          <p:cNvPr id="9" name="Picture 8" descr="A card with a person holding a flag&#10;&#10;AI-generated content may be incorrect.">
-            <a:extLst>
-              <a:ext uri="{FF2B5EF4-FFF2-40B4-BE49-F238E27FC236}">
-                <a16:creationId xmlns:a16="http://schemas.microsoft.com/office/drawing/2014/main" id="{64477E64-451F-06F3-999A-C9991894E3D4}"/>
-              </a:ext>
-            </a:extLst>
-          </p:cNvPr>
-          <p:cNvPicPr>
-            <a:picLocks noChangeAspect="1"/>
-          </p:cNvPicPr>
-          <p:nvPr/>
-        </p:nvPicPr>
-        <p:blipFill>
-          <a:blip r:embed="rId4">
-            <a:extLst>
-              <a:ext uri="{28A0092B-C50C-407E-A947-70E740481C1C}">
-                <a14:useLocalDpi xmlns:a14="http://schemas.microsoft.com/office/drawing/2010/main" val="0"/>
-              </a:ext>
-            </a:extLst>
-          </a:blip>
-          <a:stretch>
-            <a:fillRect/>
-          </a:stretch>
-        </p:blipFill>
-        <p:spPr>
-          <a:xfrm>
-            <a:off x="7445158" y="770964"/>
-            <a:ext cx="2890588" cy="4320000"/>
-          </a:xfrm>
-          <a:prstGeom prst="rect">
-            <a:avLst/>
-          </a:prstGeom>
-        </p:spPr>
-      </p:pic>
-      <p:sp>
-        <p:nvSpPr>
-          <p:cNvPr id="10" name="Arrow: Right 9">
-            <a:extLst>
-              <a:ext uri="{FF2B5EF4-FFF2-40B4-BE49-F238E27FC236}">
-                <a16:creationId xmlns:a16="http://schemas.microsoft.com/office/drawing/2014/main" id="{2933D827-BD68-D70B-47A9-016349F56852}"/>
+                <a16:creationId xmlns:a16="http://schemas.microsoft.com/office/drawing/2014/main" id="{45F553E3-21D3-1F43-BE32-94DE84DA27B0}"/>
               </a:ext>
             </a:extLst>
           </p:cNvPr>
@@ -1269,64 +1019,10 @@
         </p:nvSpPr>
         <p:spPr>
           <a:xfrm>
-            <a:off x="8348087" y="5351930"/>
-            <a:ext cx="1084730" cy="1228165"/>
+            <a:off x="4656000" y="1989000"/>
+            <a:ext cx="2880000" cy="2880000"/>
           </a:xfrm>
-          <a:prstGeom prst="rightArrow">
-            <a:avLst/>
-          </a:prstGeom>
-          <a:solidFill>
-            <a:schemeClr val="tx1"/>
-          </a:solidFill>
-          <a:ln>
-            <a:solidFill>
-              <a:schemeClr val="tx1"/>
-            </a:solidFill>
-          </a:ln>
-        </p:spPr>
-        <p:style>
-          <a:lnRef idx="2">
-            <a:schemeClr val="accent1">
-              <a:shade val="15000"/>
-            </a:schemeClr>
-          </a:lnRef>
-          <a:fillRef idx="1">
-            <a:schemeClr val="accent1"/>
-          </a:fillRef>
-          <a:effectRef idx="0">
-            <a:schemeClr val="accent1"/>
-          </a:effectRef>
-          <a:fontRef idx="minor">
-            <a:schemeClr val="lt1"/>
-          </a:fontRef>
-        </p:style>
-        <p:txBody>
-          <a:bodyPr rtlCol="0" anchor="ctr"/>
-          <a:lstStyle/>
-          <a:p>
-            <a:pPr algn="ctr"/>
-            <a:endParaRPr lang="en-DK"/>
-          </a:p>
-        </p:txBody>
-      </p:sp>
-      <p:sp>
-        <p:nvSpPr>
-          <p:cNvPr id="11" name="Arrow: Right 10">
-            <a:extLst>
-              <a:ext uri="{FF2B5EF4-FFF2-40B4-BE49-F238E27FC236}">
-                <a16:creationId xmlns:a16="http://schemas.microsoft.com/office/drawing/2014/main" id="{DD0720AD-5D1C-6828-66F0-0BDD8C94CFE8}"/>
-              </a:ext>
-            </a:extLst>
-          </p:cNvPr>
-          <p:cNvSpPr/>
-          <p:nvPr/>
-        </p:nvSpPr>
-        <p:spPr>
-          <a:xfrm rot="10800000">
-            <a:off x="2759184" y="5351929"/>
-            <a:ext cx="1084730" cy="1228165"/>
-          </a:xfrm>
-          <a:prstGeom prst="rightArrow">
+          <a:prstGeom prst="mathPlus">
             <a:avLst/>
           </a:prstGeom>
           <a:solidFill>
@@ -1366,7 +1062,7 @@
     </p:spTree>
     <p:extLst>
       <p:ext uri="{BB962C8B-B14F-4D97-AF65-F5344CB8AC3E}">
-        <p14:creationId xmlns:p14="http://schemas.microsoft.com/office/powerpoint/2010/main" val="3055568366"/>
+        <p14:creationId xmlns:p14="http://schemas.microsoft.com/office/powerpoint/2010/main" val="2592563614"/>
       </p:ext>
     </p:extLst>
   </p:cSld>
@@ -1377,138 +1073,6 @@
 </file>
 
 <file path=ppt/slides/slide2.xml><?xml version="1.0" encoding="utf-8"?>
-<p:sld xmlns:a="http://schemas.openxmlformats.org/drawingml/2006/main" xmlns:r="http://schemas.openxmlformats.org/officeDocument/2006/relationships" xmlns:p="http://schemas.openxmlformats.org/presentationml/2006/main">
-  <p:cSld>
-    <p:spTree>
-      <p:nvGrpSpPr>
-        <p:cNvPr id="1" name=""/>
-        <p:cNvGrpSpPr/>
-        <p:nvPr/>
-      </p:nvGrpSpPr>
-      <p:grpSpPr>
-        <a:xfrm>
-          <a:off x="0" y="0"/>
-          <a:ext cx="0" cy="0"/>
-          <a:chOff x="0" y="0"/>
-          <a:chExt cx="0" cy="0"/>
-        </a:xfrm>
-      </p:grpSpPr>
-      <p:pic>
-        <p:nvPicPr>
-          <p:cNvPr id="2" name="Picture 1" descr="A card with a person holding a spade and a spade&#10;&#10;AI-generated content may be incorrect.">
-            <a:extLst>
-              <a:ext uri="{FF2B5EF4-FFF2-40B4-BE49-F238E27FC236}">
-                <a16:creationId xmlns:a16="http://schemas.microsoft.com/office/drawing/2014/main" id="{C323C9AE-008C-ECC6-228D-18C2569E0DB0}"/>
-              </a:ext>
-            </a:extLst>
-          </p:cNvPr>
-          <p:cNvPicPr>
-            <a:picLocks noChangeAspect="1"/>
-          </p:cNvPicPr>
-          <p:nvPr/>
-        </p:nvPicPr>
-        <p:blipFill>
-          <a:blip r:embed="rId3">
-            <a:extLst>
-              <a:ext uri="{28A0092B-C50C-407E-A947-70E740481C1C}">
-                <a14:useLocalDpi xmlns:a14="http://schemas.microsoft.com/office/drawing/2010/main" val="0"/>
-              </a:ext>
-            </a:extLst>
-          </a:blip>
-          <a:stretch>
-            <a:fillRect/>
-          </a:stretch>
-        </p:blipFill>
-        <p:spPr>
-          <a:xfrm>
-            <a:off x="4650706" y="1269000"/>
-            <a:ext cx="2890588" cy="4320000"/>
-          </a:xfrm>
-          <a:prstGeom prst="rect">
-            <a:avLst/>
-          </a:prstGeom>
-        </p:spPr>
-      </p:pic>
-    </p:spTree>
-    <p:extLst>
-      <p:ext uri="{BB962C8B-B14F-4D97-AF65-F5344CB8AC3E}">
-        <p14:creationId xmlns:p14="http://schemas.microsoft.com/office/powerpoint/2010/main" val="2630799961"/>
-      </p:ext>
-    </p:extLst>
-  </p:cSld>
-  <p:clrMapOvr>
-    <a:masterClrMapping/>
-  </p:clrMapOvr>
-</p:sld>
-</file>
-
-<file path=ppt/slides/slide3.xml><?xml version="1.0" encoding="utf-8"?>
-<p:sld xmlns:a="http://schemas.openxmlformats.org/drawingml/2006/main" xmlns:r="http://schemas.openxmlformats.org/officeDocument/2006/relationships" xmlns:p="http://schemas.openxmlformats.org/presentationml/2006/main">
-  <p:cSld>
-    <p:spTree>
-      <p:nvGrpSpPr>
-        <p:cNvPr id="1" name=""/>
-        <p:cNvGrpSpPr/>
-        <p:nvPr/>
-      </p:nvGrpSpPr>
-      <p:grpSpPr>
-        <a:xfrm>
-          <a:off x="0" y="0"/>
-          <a:ext cx="0" cy="0"/>
-          <a:chOff x="0" y="0"/>
-          <a:chExt cx="0" cy="0"/>
-        </a:xfrm>
-      </p:grpSpPr>
-      <p:pic>
-        <p:nvPicPr>
-          <p:cNvPr id="2" name="Picture 1" descr="A card with a person holding a flag&#10;&#10;AI-generated content may be incorrect.">
-            <a:extLst>
-              <a:ext uri="{FF2B5EF4-FFF2-40B4-BE49-F238E27FC236}">
-                <a16:creationId xmlns:a16="http://schemas.microsoft.com/office/drawing/2014/main" id="{7C57B88B-71FF-F3A5-BC98-1B0C02DA5A05}"/>
-              </a:ext>
-            </a:extLst>
-          </p:cNvPr>
-          <p:cNvPicPr>
-            <a:picLocks noChangeAspect="1"/>
-          </p:cNvPicPr>
-          <p:nvPr/>
-        </p:nvPicPr>
-        <p:blipFill>
-          <a:blip r:embed="rId3">
-            <a:extLst>
-              <a:ext uri="{28A0092B-C50C-407E-A947-70E740481C1C}">
-                <a14:useLocalDpi xmlns:a14="http://schemas.microsoft.com/office/drawing/2010/main" val="0"/>
-              </a:ext>
-            </a:extLst>
-          </a:blip>
-          <a:stretch>
-            <a:fillRect/>
-          </a:stretch>
-        </p:blipFill>
-        <p:spPr>
-          <a:xfrm>
-            <a:off x="4650706" y="1269000"/>
-            <a:ext cx="2890588" cy="4320000"/>
-          </a:xfrm>
-          <a:prstGeom prst="rect">
-            <a:avLst/>
-          </a:prstGeom>
-        </p:spPr>
-      </p:pic>
-    </p:spTree>
-    <p:extLst>
-      <p:ext uri="{BB962C8B-B14F-4D97-AF65-F5344CB8AC3E}">
-        <p14:creationId xmlns:p14="http://schemas.microsoft.com/office/powerpoint/2010/main" val="2592563614"/>
-      </p:ext>
-    </p:extLst>
-  </p:cSld>
-  <p:clrMapOvr>
-    <a:masterClrMapping/>
-  </p:clrMapOvr>
-</p:sld>
-</file>
-
-<file path=ppt/slides/slide4.xml><?xml version="1.0" encoding="utf-8"?>
 <p:sld xmlns:a="http://schemas.openxmlformats.org/drawingml/2006/main" xmlns:r="http://schemas.openxmlformats.org/officeDocument/2006/relationships" xmlns:p="http://schemas.openxmlformats.org/presentationml/2006/main">
   <p:cSld>
     <p:spTree>

</xml_diff>